<commit_message>
impr: Change agent name and improve Helios project docx
</commit_message>
<xml_diff>
--- a/agentic_backend/app/agents/content_generator/templates/pptx/template_fiche_ref_projet.pptx
+++ b/agentic_backend/app/agents/content_generator/templates/pptx/template_fiche_ref_projet.pptx
@@ -197,7 +197,7 @@
           <a:p>
             <a:fld id="{FA1B813A-813C-4C80-B881-6821C44513BD}" type="datetimeFigureOut">
               <a:rPr lang="en-GB" smtClean="0"/>
-              <a:t>26/09/2025</a:t>
+              <a:t>17/10/2025</a:t>
             </a:fld>
             <a:endParaRPr lang="en-GB"/>
           </a:p>
@@ -13714,24 +13714,21 @@
                   <a:schemeClr val="bg1"/>
                 </a:solidFill>
               </a:rPr>
-              <a:t> financier : </a:t>
+              <a:t> financier </a:t>
             </a:r>
             <a:r>
-              <a:rPr lang="en-GB" sz="1600" dirty="0" err="1">
+              <a:rPr lang="en-GB" sz="1600">
                 <a:solidFill>
                   <a:schemeClr val="bg1"/>
                 </a:solidFill>
               </a:rPr>
-              <a:t>XXXk</a:t>
+              <a:t>: XXXM€</a:t>
             </a:r>
-            <a:r>
-              <a:rPr lang="en-GB" sz="1600" dirty="0">
-                <a:solidFill>
-                  <a:schemeClr val="bg1"/>
-                </a:solidFill>
-              </a:rPr>
-              <a:t>€</a:t>
-            </a:r>
+            <a:endParaRPr lang="en-GB" sz="1600" dirty="0">
+              <a:solidFill>
+                <a:schemeClr val="bg1"/>
+              </a:solidFill>
+            </a:endParaRPr>
           </a:p>
         </p:txBody>
       </p:sp>

</xml_diff>

<commit_message>
impr: Improve slide generation and document storage architecture (#692)
* impr: Change agent name and improve Helios project docx

* fix: Filenames (pptx & pdf) in content_store not temporary ones anymore
</commit_message>
<xml_diff>
--- a/agentic_backend/app/agents/content_generator/templates/pptx/template_fiche_ref_projet.pptx
+++ b/agentic_backend/app/agents/content_generator/templates/pptx/template_fiche_ref_projet.pptx
@@ -197,7 +197,7 @@
           <a:p>
             <a:fld id="{FA1B813A-813C-4C80-B881-6821C44513BD}" type="datetimeFigureOut">
               <a:rPr lang="en-GB" smtClean="0"/>
-              <a:t>26/09/2025</a:t>
+              <a:t>17/10/2025</a:t>
             </a:fld>
             <a:endParaRPr lang="en-GB"/>
           </a:p>
@@ -13714,24 +13714,21 @@
                   <a:schemeClr val="bg1"/>
                 </a:solidFill>
               </a:rPr>
-              <a:t> financier : </a:t>
+              <a:t> financier </a:t>
             </a:r>
             <a:r>
-              <a:rPr lang="en-GB" sz="1600" dirty="0" err="1">
+              <a:rPr lang="en-GB" sz="1600">
                 <a:solidFill>
                   <a:schemeClr val="bg1"/>
                 </a:solidFill>
               </a:rPr>
-              <a:t>XXXk</a:t>
+              <a:t>: XXXM€</a:t>
             </a:r>
-            <a:r>
-              <a:rPr lang="en-GB" sz="1600" dirty="0">
-                <a:solidFill>
-                  <a:schemeClr val="bg1"/>
-                </a:solidFill>
-              </a:rPr>
-              <a:t>€</a:t>
-            </a:r>
+            <a:endParaRPr lang="en-GB" sz="1600" dirty="0">
+              <a:solidFill>
+                <a:schemeClr val="bg1"/>
+              </a:solidFill>
+            </a:endParaRPr>
           </a:p>
         </p:txBody>
       </p:sp>

</xml_diff>